<commit_message>
Fix typos on slides
</commit_message>
<xml_diff>
--- a/Slides_BasketballInJS.pptx
+++ b/Slides_BasketballInJS.pptx
@@ -324,6 +324,11 @@
       </a:defRPr>
     </a:lvl9pPr>
   </p:defaultTextStyle>
+  <p:extLst>
+    <p:ext uri="{EFAFB233-063F-42B5-8137-9DF3F51BA10A}">
+      <p15:sldGuideLst xmlns:p15="http://schemas.microsoft.com/office/powerpoint/2012/main"/>
+    </p:ext>
+  </p:extLst>
 </p:presentation>
 </file>
 
@@ -1259,7 +1264,7 @@
           </a:ln>
           <a:extLst>
             <a:ext uri="{C572A759-6A51-4108-AA02-DFA0A04FC94B}">
-              <ma14:wrappingTextBoxFlag xmlns:ma14="http://schemas.microsoft.com/office/mac/drawingml/2011/main" xmlns:a14="http://schemas.microsoft.com/office/drawing/2010/main" xmlns:m="http://schemas.openxmlformats.org/officeDocument/2006/math" xmlns="" val="1"/>
+              <ma14:wrappingTextBoxFlag xmlns="" xmlns:m="http://schemas.openxmlformats.org/officeDocument/2006/math" xmlns:a14="http://schemas.microsoft.com/office/drawing/2010/main" xmlns:ma14="http://schemas.microsoft.com/office/mac/drawingml/2011/main" val="1"/>
             </a:ext>
           </a:extLst>
         </p:spPr>
@@ -1296,7 +1301,7 @@
           </a:ln>
           <a:extLst>
             <a:ext uri="{C572A759-6A51-4108-AA02-DFA0A04FC94B}">
-              <ma14:wrappingTextBoxFlag xmlns:ma14="http://schemas.microsoft.com/office/mac/drawingml/2011/main" xmlns:a14="http://schemas.microsoft.com/office/drawing/2010/main" xmlns:m="http://schemas.openxmlformats.org/officeDocument/2006/math" xmlns="" val="1"/>
+              <ma14:wrappingTextBoxFlag xmlns="" xmlns:m="http://schemas.openxmlformats.org/officeDocument/2006/math" xmlns:a14="http://schemas.microsoft.com/office/drawing/2010/main" xmlns:ma14="http://schemas.microsoft.com/office/mac/drawingml/2011/main" val="1"/>
             </a:ext>
           </a:extLst>
         </p:spPr>
@@ -2142,7 +2147,7 @@
           </a:ln>
           <a:extLst>
             <a:ext uri="{C572A759-6A51-4108-AA02-DFA0A04FC94B}">
-              <ma14:wrappingTextBoxFlag xmlns:ma14="http://schemas.microsoft.com/office/mac/drawingml/2011/main" xmlns:a14="http://schemas.microsoft.com/office/drawing/2010/main" xmlns:m="http://schemas.openxmlformats.org/officeDocument/2006/math" xmlns="" val="1"/>
+              <ma14:wrappingTextBoxFlag xmlns="" xmlns:m="http://schemas.openxmlformats.org/officeDocument/2006/math" xmlns:a14="http://schemas.microsoft.com/office/drawing/2010/main" xmlns:ma14="http://schemas.microsoft.com/office/mac/drawingml/2011/main" val="1"/>
             </a:ext>
           </a:extLst>
         </p:spPr>
@@ -2290,7 +2295,7 @@
           </a:prstGeom>
           <a:extLst>
             <a:ext uri="{C572A759-6A51-4108-AA02-DFA0A04FC94B}">
-              <ma14:wrappingTextBoxFlag xmlns:ma14="http://schemas.microsoft.com/office/mac/drawingml/2011/main" xmlns:a14="http://schemas.microsoft.com/office/drawing/2010/main" xmlns:m="http://schemas.openxmlformats.org/officeDocument/2006/math" xmlns="" val="1"/>
+              <ma14:wrappingTextBoxFlag xmlns="" xmlns:m="http://schemas.openxmlformats.org/officeDocument/2006/math" xmlns:a14="http://schemas.microsoft.com/office/drawing/2010/main" xmlns:ma14="http://schemas.microsoft.com/office/mac/drawingml/2011/main" val="1"/>
             </a:ext>
           </a:extLst>
         </p:spPr>
@@ -2337,7 +2342,7 @@
           </a:ln>
           <a:extLst>
             <a:ext uri="{C572A759-6A51-4108-AA02-DFA0A04FC94B}">
-              <ma14:wrappingTextBoxFlag xmlns:ma14="http://schemas.microsoft.com/office/mac/drawingml/2011/main" xmlns:a14="http://schemas.microsoft.com/office/drawing/2010/main" xmlns:m="http://schemas.openxmlformats.org/officeDocument/2006/math" xmlns="" val="1"/>
+              <ma14:wrappingTextBoxFlag xmlns="" xmlns:m="http://schemas.openxmlformats.org/officeDocument/2006/math" xmlns:a14="http://schemas.microsoft.com/office/drawing/2010/main" xmlns:ma14="http://schemas.microsoft.com/office/mac/drawingml/2011/main" val="1"/>
             </a:ext>
           </a:extLst>
         </p:spPr>
@@ -2509,7 +2514,7 @@
                 <a:latin typeface="Courier New" panose="02070309020205020404" pitchFamily="49" charset="0"/>
                 <a:cs typeface="Courier New" panose="02070309020205020404" pitchFamily="49" charset="0"/>
               </a:rPr>
-              <a:t> = </a:t>
+              <a:t> - </a:t>
             </a:r>
             <a:r>
               <a:rPr lang="en-US" sz="3600" dirty="0" err="1">
@@ -2650,7 +2655,7 @@
           </a:prstGeom>
           <a:extLst>
             <a:ext uri="{C572A759-6A51-4108-AA02-DFA0A04FC94B}">
-              <ma14:wrappingTextBoxFlag xmlns:ma14="http://schemas.microsoft.com/office/mac/drawingml/2011/main" xmlns:a14="http://schemas.microsoft.com/office/drawing/2010/main" xmlns:m="http://schemas.openxmlformats.org/officeDocument/2006/math" xmlns="" val="1"/>
+              <ma14:wrappingTextBoxFlag xmlns="" xmlns:m="http://schemas.openxmlformats.org/officeDocument/2006/math" xmlns:a14="http://schemas.microsoft.com/office/drawing/2010/main" xmlns:ma14="http://schemas.microsoft.com/office/mac/drawingml/2011/main" val="1"/>
             </a:ext>
           </a:extLst>
         </p:spPr>
@@ -2697,7 +2702,7 @@
           </a:ln>
           <a:extLst>
             <a:ext uri="{C572A759-6A51-4108-AA02-DFA0A04FC94B}">
-              <ma14:wrappingTextBoxFlag xmlns:ma14="http://schemas.microsoft.com/office/mac/drawingml/2011/main" xmlns:a14="http://schemas.microsoft.com/office/drawing/2010/main" xmlns:m="http://schemas.openxmlformats.org/officeDocument/2006/math" xmlns="" val="1"/>
+              <ma14:wrappingTextBoxFlag xmlns="" xmlns:m="http://schemas.openxmlformats.org/officeDocument/2006/math" xmlns:a14="http://schemas.microsoft.com/office/drawing/2010/main" xmlns:ma14="http://schemas.microsoft.com/office/mac/drawingml/2011/main" val="1"/>
             </a:ext>
           </a:extLst>
         </p:spPr>
@@ -3056,7 +3061,7 @@
           </a:prstGeom>
           <a:extLst>
             <a:ext uri="{C572A759-6A51-4108-AA02-DFA0A04FC94B}">
-              <ma14:wrappingTextBoxFlag xmlns:ma14="http://schemas.microsoft.com/office/mac/drawingml/2011/main" xmlns:a14="http://schemas.microsoft.com/office/drawing/2010/main" xmlns:m="http://schemas.openxmlformats.org/officeDocument/2006/math" xmlns="" val="1"/>
+              <ma14:wrappingTextBoxFlag xmlns="" xmlns:m="http://schemas.openxmlformats.org/officeDocument/2006/math" xmlns:a14="http://schemas.microsoft.com/office/drawing/2010/main" xmlns:ma14="http://schemas.microsoft.com/office/mac/drawingml/2011/main" val="1"/>
             </a:ext>
           </a:extLst>
         </p:spPr>
@@ -3103,7 +3108,7 @@
           </a:ln>
           <a:extLst>
             <a:ext uri="{C572A759-6A51-4108-AA02-DFA0A04FC94B}">
-              <ma14:wrappingTextBoxFlag xmlns:ma14="http://schemas.microsoft.com/office/mac/drawingml/2011/main" xmlns:a14="http://schemas.microsoft.com/office/drawing/2010/main" xmlns:m="http://schemas.openxmlformats.org/officeDocument/2006/math" xmlns="" val="1"/>
+              <ma14:wrappingTextBoxFlag xmlns="" xmlns:m="http://schemas.openxmlformats.org/officeDocument/2006/math" xmlns:a14="http://schemas.microsoft.com/office/drawing/2010/main" xmlns:ma14="http://schemas.microsoft.com/office/mac/drawingml/2011/main" val="1"/>
             </a:ext>
           </a:extLst>
         </p:spPr>
@@ -3656,7 +3661,7 @@
           </a:prstGeom>
           <a:extLst>
             <a:ext uri="{C572A759-6A51-4108-AA02-DFA0A04FC94B}">
-              <ma14:wrappingTextBoxFlag xmlns:ma14="http://schemas.microsoft.com/office/mac/drawingml/2011/main" xmlns:a14="http://schemas.microsoft.com/office/drawing/2010/main" xmlns:m="http://schemas.openxmlformats.org/officeDocument/2006/math" xmlns="" val="1"/>
+              <ma14:wrappingTextBoxFlag xmlns="" xmlns:m="http://schemas.openxmlformats.org/officeDocument/2006/math" xmlns:a14="http://schemas.microsoft.com/office/drawing/2010/main" xmlns:ma14="http://schemas.microsoft.com/office/mac/drawingml/2011/main" val="1"/>
             </a:ext>
           </a:extLst>
         </p:spPr>
@@ -3703,7 +3708,7 @@
           </a:ln>
           <a:extLst>
             <a:ext uri="{C572A759-6A51-4108-AA02-DFA0A04FC94B}">
-              <ma14:wrappingTextBoxFlag xmlns:ma14="http://schemas.microsoft.com/office/mac/drawingml/2011/main" xmlns:a14="http://schemas.microsoft.com/office/drawing/2010/main" xmlns:m="http://schemas.openxmlformats.org/officeDocument/2006/math" xmlns="" val="1"/>
+              <ma14:wrappingTextBoxFlag xmlns="" xmlns:m="http://schemas.openxmlformats.org/officeDocument/2006/math" xmlns:a14="http://schemas.microsoft.com/office/drawing/2010/main" xmlns:ma14="http://schemas.microsoft.com/office/mac/drawingml/2011/main" val="1"/>
             </a:ext>
           </a:extLst>
         </p:spPr>
@@ -3909,7 +3914,7 @@
           </a:prstGeom>
           <a:extLst>
             <a:ext uri="{C572A759-6A51-4108-AA02-DFA0A04FC94B}">
-              <ma14:wrappingTextBoxFlag xmlns:ma14="http://schemas.microsoft.com/office/mac/drawingml/2011/main" xmlns:a14="http://schemas.microsoft.com/office/drawing/2010/main" xmlns:m="http://schemas.openxmlformats.org/officeDocument/2006/math" xmlns="" val="1"/>
+              <ma14:wrappingTextBoxFlag xmlns="" xmlns:m="http://schemas.openxmlformats.org/officeDocument/2006/math" xmlns:a14="http://schemas.microsoft.com/office/drawing/2010/main" xmlns:ma14="http://schemas.microsoft.com/office/mac/drawingml/2011/main" val="1"/>
             </a:ext>
           </a:extLst>
         </p:spPr>
@@ -3956,7 +3961,7 @@
           </a:ln>
           <a:extLst>
             <a:ext uri="{C572A759-6A51-4108-AA02-DFA0A04FC94B}">
-              <ma14:wrappingTextBoxFlag xmlns:ma14="http://schemas.microsoft.com/office/mac/drawingml/2011/main" xmlns:a14="http://schemas.microsoft.com/office/drawing/2010/main" xmlns:m="http://schemas.openxmlformats.org/officeDocument/2006/math" xmlns="" val="1"/>
+              <ma14:wrappingTextBoxFlag xmlns="" xmlns:m="http://schemas.openxmlformats.org/officeDocument/2006/math" xmlns:a14="http://schemas.microsoft.com/office/drawing/2010/main" xmlns:ma14="http://schemas.microsoft.com/office/mac/drawingml/2011/main" val="1"/>
             </a:ext>
           </a:extLst>
         </p:spPr>
@@ -4114,7 +4119,7 @@
                 <a:latin typeface="Courier New" panose="02070309020205020404" pitchFamily="49" charset="0"/>
                 <a:cs typeface="Courier New" panose="02070309020205020404" pitchFamily="49" charset="0"/>
               </a:rPr>
-              <a:t>basketbasll.radius</a:t>
+              <a:t>basketball.radius</a:t>
             </a:r>
             <a:r>
               <a:rPr lang="en-US" sz="2800" b="1" dirty="0">
@@ -4210,7 +4215,7 @@
           </a:ln>
           <a:extLst>
             <a:ext uri="{C572A759-6A51-4108-AA02-DFA0A04FC94B}">
-              <ma14:wrappingTextBoxFlag xmlns:ma14="http://schemas.microsoft.com/office/mac/drawingml/2011/main" xmlns:a14="http://schemas.microsoft.com/office/drawing/2010/main" xmlns:m="http://schemas.openxmlformats.org/officeDocument/2006/math" xmlns="" val="1"/>
+              <ma14:wrappingTextBoxFlag xmlns="" xmlns:m="http://schemas.openxmlformats.org/officeDocument/2006/math" xmlns:a14="http://schemas.microsoft.com/office/drawing/2010/main" xmlns:ma14="http://schemas.microsoft.com/office/mac/drawingml/2011/main" val="1"/>
             </a:ext>
           </a:extLst>
         </p:spPr>
@@ -4287,7 +4292,7 @@
           </a:prstGeom>
           <a:extLst>
             <a:ext uri="{C572A759-6A51-4108-AA02-DFA0A04FC94B}">
-              <ma14:wrappingTextBoxFlag xmlns:ma14="http://schemas.microsoft.com/office/mac/drawingml/2011/main" xmlns:a14="http://schemas.microsoft.com/office/drawing/2010/main" xmlns:m="http://schemas.openxmlformats.org/officeDocument/2006/math" xmlns="" val="1"/>
+              <ma14:wrappingTextBoxFlag xmlns="" xmlns:m="http://schemas.openxmlformats.org/officeDocument/2006/math" xmlns:a14="http://schemas.microsoft.com/office/drawing/2010/main" xmlns:ma14="http://schemas.microsoft.com/office/mac/drawingml/2011/main" val="1"/>
             </a:ext>
           </a:extLst>
         </p:spPr>
@@ -4334,7 +4339,7 @@
           </a:ln>
           <a:extLst>
             <a:ext uri="{C572A759-6A51-4108-AA02-DFA0A04FC94B}">
-              <ma14:wrappingTextBoxFlag xmlns:ma14="http://schemas.microsoft.com/office/mac/drawingml/2011/main" xmlns:a14="http://schemas.microsoft.com/office/drawing/2010/main" xmlns:m="http://schemas.openxmlformats.org/officeDocument/2006/math" xmlns="" val="1"/>
+              <ma14:wrappingTextBoxFlag xmlns="" xmlns:m="http://schemas.openxmlformats.org/officeDocument/2006/math" xmlns:a14="http://schemas.microsoft.com/office/drawing/2010/main" xmlns:ma14="http://schemas.microsoft.com/office/mac/drawingml/2011/main" val="1"/>
             </a:ext>
           </a:extLst>
         </p:spPr>
@@ -4466,7 +4471,7 @@
           </a:prstGeom>
           <a:extLst>
             <a:ext uri="{C572A759-6A51-4108-AA02-DFA0A04FC94B}">
-              <ma14:wrappingTextBoxFlag xmlns:ma14="http://schemas.microsoft.com/office/mac/drawingml/2011/main" xmlns:a14="http://schemas.microsoft.com/office/drawing/2010/main" xmlns:m="http://schemas.openxmlformats.org/officeDocument/2006/math" xmlns="" val="1"/>
+              <ma14:wrappingTextBoxFlag xmlns="" xmlns:m="http://schemas.openxmlformats.org/officeDocument/2006/math" xmlns:a14="http://schemas.microsoft.com/office/drawing/2010/main" xmlns:ma14="http://schemas.microsoft.com/office/mac/drawingml/2011/main" val="1"/>
             </a:ext>
           </a:extLst>
         </p:spPr>
@@ -4513,7 +4518,7 @@
           </a:ln>
           <a:extLst>
             <a:ext uri="{C572A759-6A51-4108-AA02-DFA0A04FC94B}">
-              <ma14:wrappingTextBoxFlag xmlns:ma14="http://schemas.microsoft.com/office/mac/drawingml/2011/main" xmlns:a14="http://schemas.microsoft.com/office/drawing/2010/main" xmlns:m="http://schemas.openxmlformats.org/officeDocument/2006/math" xmlns="" val="1"/>
+              <ma14:wrappingTextBoxFlag xmlns="" xmlns:m="http://schemas.openxmlformats.org/officeDocument/2006/math" xmlns:a14="http://schemas.microsoft.com/office/drawing/2010/main" xmlns:ma14="http://schemas.microsoft.com/office/mac/drawingml/2011/main" val="1"/>
             </a:ext>
           </a:extLst>
         </p:spPr>
@@ -4671,7 +4676,7 @@
           </a:prstGeom>
           <a:extLst>
             <a:ext uri="{C572A759-6A51-4108-AA02-DFA0A04FC94B}">
-              <ma14:wrappingTextBoxFlag xmlns:ma14="http://schemas.microsoft.com/office/mac/drawingml/2011/main" xmlns:a14="http://schemas.microsoft.com/office/drawing/2010/main" xmlns:m="http://schemas.openxmlformats.org/officeDocument/2006/math" xmlns="" val="1"/>
+              <ma14:wrappingTextBoxFlag xmlns="" xmlns:m="http://schemas.openxmlformats.org/officeDocument/2006/math" xmlns:a14="http://schemas.microsoft.com/office/drawing/2010/main" xmlns:ma14="http://schemas.microsoft.com/office/mac/drawingml/2011/main" val="1"/>
             </a:ext>
           </a:extLst>
         </p:spPr>
@@ -4718,7 +4723,7 @@
           </a:ln>
           <a:extLst>
             <a:ext uri="{C572A759-6A51-4108-AA02-DFA0A04FC94B}">
-              <ma14:wrappingTextBoxFlag xmlns:ma14="http://schemas.microsoft.com/office/mac/drawingml/2011/main" xmlns:a14="http://schemas.microsoft.com/office/drawing/2010/main" xmlns:m="http://schemas.openxmlformats.org/officeDocument/2006/math" xmlns="" val="1"/>
+              <ma14:wrappingTextBoxFlag xmlns="" xmlns:m="http://schemas.openxmlformats.org/officeDocument/2006/math" xmlns:a14="http://schemas.microsoft.com/office/drawing/2010/main" xmlns:ma14="http://schemas.microsoft.com/office/mac/drawingml/2011/main" val="1"/>
             </a:ext>
           </a:extLst>
         </p:spPr>
@@ -5409,8 +5414,8 @@
             <a:chExt cx="1734840" cy="3361680"/>
           </a:xfrm>
         </p:grpSpPr>
-        <mc:AlternateContent xmlns:mc="http://schemas.openxmlformats.org/markup-compatibility/2006">
-          <mc:Choice xmlns:p14="http://schemas.microsoft.com/office/powerpoint/2010/main" Requires="p14">
+        <mc:AlternateContent xmlns:mc="http://schemas.openxmlformats.org/markup-compatibility/2006" xmlns:p14="http://schemas.microsoft.com/office/powerpoint/2010/main">
+          <mc:Choice Requires="p14">
             <p:contentPart p14:bwMode="auto" r:id="rId2">
               <p14:nvContentPartPr>
                 <p14:cNvPr id="12" name="Ink 11">
@@ -5429,7 +5434,7 @@
               </p14:xfrm>
             </p:contentPart>
           </mc:Choice>
-          <mc:Fallback>
+          <mc:Fallback xmlns="">
             <p:pic>
               <p:nvPicPr>
                 <p:cNvPr id="12" name="Ink 11">
@@ -5460,8 +5465,8 @@
             </p:pic>
           </mc:Fallback>
         </mc:AlternateContent>
-        <mc:AlternateContent xmlns:mc="http://schemas.openxmlformats.org/markup-compatibility/2006">
-          <mc:Choice xmlns:p14="http://schemas.microsoft.com/office/powerpoint/2010/main" Requires="p14">
+        <mc:AlternateContent xmlns:mc="http://schemas.openxmlformats.org/markup-compatibility/2006" xmlns:p14="http://schemas.microsoft.com/office/powerpoint/2010/main">
+          <mc:Choice Requires="p14">
             <p:contentPart p14:bwMode="auto" r:id="rId4">
               <p14:nvContentPartPr>
                 <p14:cNvPr id="13" name="Ink 12">
@@ -5480,7 +5485,7 @@
               </p14:xfrm>
             </p:contentPart>
           </mc:Choice>
-          <mc:Fallback>
+          <mc:Fallback xmlns="">
             <p:pic>
               <p:nvPicPr>
                 <p:cNvPr id="13" name="Ink 12">
@@ -5532,8 +5537,8 @@
             <a:chExt cx="2873880" cy="5418000"/>
           </a:xfrm>
         </p:grpSpPr>
-        <mc:AlternateContent xmlns:mc="http://schemas.openxmlformats.org/markup-compatibility/2006">
-          <mc:Choice xmlns:p14="http://schemas.microsoft.com/office/powerpoint/2010/main" Requires="p14">
+        <mc:AlternateContent xmlns:mc="http://schemas.openxmlformats.org/markup-compatibility/2006" xmlns:p14="http://schemas.microsoft.com/office/powerpoint/2010/main">
+          <mc:Choice Requires="p14">
             <p:contentPart p14:bwMode="auto" r:id="rId6">
               <p14:nvContentPartPr>
                 <p14:cNvPr id="15" name="Ink 14">
@@ -5552,7 +5557,7 @@
               </p14:xfrm>
             </p:contentPart>
           </mc:Choice>
-          <mc:Fallback>
+          <mc:Fallback xmlns="">
             <p:pic>
               <p:nvPicPr>
                 <p:cNvPr id="15" name="Ink 14">
@@ -5583,8 +5588,8 @@
             </p:pic>
           </mc:Fallback>
         </mc:AlternateContent>
-        <mc:AlternateContent xmlns:mc="http://schemas.openxmlformats.org/markup-compatibility/2006">
-          <mc:Choice xmlns:p14="http://schemas.microsoft.com/office/powerpoint/2010/main" Requires="p14">
+        <mc:AlternateContent xmlns:mc="http://schemas.openxmlformats.org/markup-compatibility/2006" xmlns:p14="http://schemas.microsoft.com/office/powerpoint/2010/main">
+          <mc:Choice Requires="p14">
             <p:contentPart p14:bwMode="auto" r:id="rId8">
               <p14:nvContentPartPr>
                 <p14:cNvPr id="16" name="Ink 15">
@@ -5603,7 +5608,7 @@
               </p14:xfrm>
             </p:contentPart>
           </mc:Choice>
-          <mc:Fallback>
+          <mc:Fallback xmlns="">
             <p:pic>
               <p:nvPicPr>
                 <p:cNvPr id="16" name="Ink 15">
@@ -5635,8 +5640,8 @@
           </mc:Fallback>
         </mc:AlternateContent>
       </p:grpSp>
-      <mc:AlternateContent xmlns:mc="http://schemas.openxmlformats.org/markup-compatibility/2006">
-        <mc:Choice xmlns:p14="http://schemas.microsoft.com/office/powerpoint/2010/main" Requires="p14">
+      <mc:AlternateContent xmlns:mc="http://schemas.openxmlformats.org/markup-compatibility/2006" xmlns:p14="http://schemas.microsoft.com/office/powerpoint/2010/main">
+        <mc:Choice Requires="p14">
           <p:contentPart p14:bwMode="auto" r:id="rId10">
             <p14:nvContentPartPr>
               <p14:cNvPr id="18" name="Ink 17">
@@ -5655,7 +5660,7 @@
             </p14:xfrm>
           </p:contentPart>
         </mc:Choice>
-        <mc:Fallback>
+        <mc:Fallback xmlns="">
           <p:pic>
             <p:nvPicPr>
               <p:cNvPr id="18" name="Ink 17">
@@ -5686,8 +5691,8 @@
           </p:pic>
         </mc:Fallback>
       </mc:AlternateContent>
-      <mc:AlternateContent xmlns:mc="http://schemas.openxmlformats.org/markup-compatibility/2006">
-        <mc:Choice xmlns:p14="http://schemas.microsoft.com/office/powerpoint/2010/main" Requires="p14">
+      <mc:AlternateContent xmlns:mc="http://schemas.openxmlformats.org/markup-compatibility/2006" xmlns:p14="http://schemas.microsoft.com/office/powerpoint/2010/main">
+        <mc:Choice Requires="p14">
           <p:contentPart p14:bwMode="auto" r:id="rId12">
             <p14:nvContentPartPr>
               <p14:cNvPr id="19" name="Ink 18">
@@ -5706,7 +5711,7 @@
             </p14:xfrm>
           </p:contentPart>
         </mc:Choice>
-        <mc:Fallback>
+        <mc:Fallback xmlns="">
           <p:pic>
             <p:nvPicPr>
               <p:cNvPr id="19" name="Ink 18">
@@ -5737,8 +5742,8 @@
           </p:pic>
         </mc:Fallback>
       </mc:AlternateContent>
-      <mc:AlternateContent xmlns:mc="http://schemas.openxmlformats.org/markup-compatibility/2006">
-        <mc:Choice xmlns:p14="http://schemas.microsoft.com/office/powerpoint/2010/main" Requires="p14">
+      <mc:AlternateContent xmlns:mc="http://schemas.openxmlformats.org/markup-compatibility/2006" xmlns:p14="http://schemas.microsoft.com/office/powerpoint/2010/main">
+        <mc:Choice Requires="p14">
           <p:contentPart p14:bwMode="auto" r:id="rId13">
             <p14:nvContentPartPr>
               <p14:cNvPr id="20" name="Ink 19">
@@ -5757,7 +5762,7 @@
             </p14:xfrm>
           </p:contentPart>
         </mc:Choice>
-        <mc:Fallback>
+        <mc:Fallback xmlns="">
           <p:pic>
             <p:nvPicPr>
               <p:cNvPr id="20" name="Ink 19">
@@ -5935,7 +5940,7 @@
           </a:prstGeom>
           <a:extLst>
             <a:ext uri="{C572A759-6A51-4108-AA02-DFA0A04FC94B}">
-              <ma14:wrappingTextBoxFlag xmlns:ma14="http://schemas.microsoft.com/office/mac/drawingml/2011/main" xmlns:a14="http://schemas.microsoft.com/office/drawing/2010/main" xmlns:m="http://schemas.openxmlformats.org/officeDocument/2006/math" xmlns="" val="1"/>
+              <ma14:wrappingTextBoxFlag xmlns="" xmlns:m="http://schemas.openxmlformats.org/officeDocument/2006/math" xmlns:a14="http://schemas.microsoft.com/office/drawing/2010/main" xmlns:ma14="http://schemas.microsoft.com/office/mac/drawingml/2011/main" val="1"/>
             </a:ext>
           </a:extLst>
         </p:spPr>
@@ -5982,7 +5987,7 @@
           </a:ln>
           <a:extLst>
             <a:ext uri="{C572A759-6A51-4108-AA02-DFA0A04FC94B}">
-              <ma14:wrappingTextBoxFlag xmlns:ma14="http://schemas.microsoft.com/office/mac/drawingml/2011/main" xmlns:a14="http://schemas.microsoft.com/office/drawing/2010/main" xmlns:m="http://schemas.openxmlformats.org/officeDocument/2006/math" xmlns="" val="1"/>
+              <ma14:wrappingTextBoxFlag xmlns="" xmlns:m="http://schemas.openxmlformats.org/officeDocument/2006/math" xmlns:a14="http://schemas.microsoft.com/office/drawing/2010/main" xmlns:ma14="http://schemas.microsoft.com/office/mac/drawingml/2011/main" val="1"/>
             </a:ext>
           </a:extLst>
         </p:spPr>
@@ -6186,7 +6191,7 @@
           </a:prstGeom>
           <a:extLst>
             <a:ext uri="{C572A759-6A51-4108-AA02-DFA0A04FC94B}">
-              <ma14:wrappingTextBoxFlag xmlns:ma14="http://schemas.microsoft.com/office/mac/drawingml/2011/main" xmlns:a14="http://schemas.microsoft.com/office/drawing/2010/main" xmlns:m="http://schemas.openxmlformats.org/officeDocument/2006/math" xmlns="" val="1"/>
+              <ma14:wrappingTextBoxFlag xmlns="" xmlns:m="http://schemas.openxmlformats.org/officeDocument/2006/math" xmlns:a14="http://schemas.microsoft.com/office/drawing/2010/main" xmlns:ma14="http://schemas.microsoft.com/office/mac/drawingml/2011/main" val="1"/>
             </a:ext>
           </a:extLst>
         </p:spPr>
@@ -6233,7 +6238,7 @@
           </a:ln>
           <a:extLst>
             <a:ext uri="{C572A759-6A51-4108-AA02-DFA0A04FC94B}">
-              <ma14:wrappingTextBoxFlag xmlns:ma14="http://schemas.microsoft.com/office/mac/drawingml/2011/main" xmlns:a14="http://schemas.microsoft.com/office/drawing/2010/main" xmlns:m="http://schemas.openxmlformats.org/officeDocument/2006/math" xmlns="" val="1"/>
+              <ma14:wrappingTextBoxFlag xmlns="" xmlns:m="http://schemas.openxmlformats.org/officeDocument/2006/math" xmlns:a14="http://schemas.microsoft.com/office/drawing/2010/main" xmlns:ma14="http://schemas.microsoft.com/office/mac/drawingml/2011/main" val="1"/>
             </a:ext>
           </a:extLst>
         </p:spPr>
@@ -6567,7 +6572,7 @@
           </a:prstGeom>
           <a:extLst>
             <a:ext uri="{C572A759-6A51-4108-AA02-DFA0A04FC94B}">
-              <ma14:wrappingTextBoxFlag xmlns:ma14="http://schemas.microsoft.com/office/mac/drawingml/2011/main" xmlns:a14="http://schemas.microsoft.com/office/drawing/2010/main" xmlns:m="http://schemas.openxmlformats.org/officeDocument/2006/math" xmlns="" val="1"/>
+              <ma14:wrappingTextBoxFlag xmlns="" xmlns:m="http://schemas.openxmlformats.org/officeDocument/2006/math" xmlns:a14="http://schemas.microsoft.com/office/drawing/2010/main" xmlns:ma14="http://schemas.microsoft.com/office/mac/drawingml/2011/main" val="1"/>
             </a:ext>
           </a:extLst>
         </p:spPr>
@@ -6614,7 +6619,7 @@
           </a:ln>
           <a:extLst>
             <a:ext uri="{C572A759-6A51-4108-AA02-DFA0A04FC94B}">
-              <ma14:wrappingTextBoxFlag xmlns:ma14="http://schemas.microsoft.com/office/mac/drawingml/2011/main" xmlns:a14="http://schemas.microsoft.com/office/drawing/2010/main" xmlns:m="http://schemas.openxmlformats.org/officeDocument/2006/math" xmlns="" val="1"/>
+              <ma14:wrappingTextBoxFlag xmlns="" xmlns:m="http://schemas.openxmlformats.org/officeDocument/2006/math" xmlns:a14="http://schemas.microsoft.com/office/drawing/2010/main" xmlns:ma14="http://schemas.microsoft.com/office/mac/drawingml/2011/main" val="1"/>
             </a:ext>
           </a:extLst>
         </p:spPr>
@@ -6843,7 +6848,7 @@
           </a:prstGeom>
           <a:extLst>
             <a:ext uri="{C572A759-6A51-4108-AA02-DFA0A04FC94B}">
-              <ma14:wrappingTextBoxFlag xmlns:ma14="http://schemas.microsoft.com/office/mac/drawingml/2011/main" xmlns:a14="http://schemas.microsoft.com/office/drawing/2010/main" xmlns:m="http://schemas.openxmlformats.org/officeDocument/2006/math" xmlns="" val="1"/>
+              <ma14:wrappingTextBoxFlag xmlns="" xmlns:m="http://schemas.openxmlformats.org/officeDocument/2006/math" xmlns:a14="http://schemas.microsoft.com/office/drawing/2010/main" xmlns:ma14="http://schemas.microsoft.com/office/mac/drawingml/2011/main" val="1"/>
             </a:ext>
           </a:extLst>
         </p:spPr>
@@ -6890,7 +6895,7 @@
           </a:ln>
           <a:extLst>
             <a:ext uri="{C572A759-6A51-4108-AA02-DFA0A04FC94B}">
-              <ma14:wrappingTextBoxFlag xmlns:ma14="http://schemas.microsoft.com/office/mac/drawingml/2011/main" xmlns:a14="http://schemas.microsoft.com/office/drawing/2010/main" xmlns:m="http://schemas.openxmlformats.org/officeDocument/2006/math" xmlns="" val="1"/>
+              <ma14:wrappingTextBoxFlag xmlns="" xmlns:m="http://schemas.openxmlformats.org/officeDocument/2006/math" xmlns:a14="http://schemas.microsoft.com/office/drawing/2010/main" xmlns:ma14="http://schemas.microsoft.com/office/mac/drawingml/2011/main" val="1"/>
             </a:ext>
           </a:extLst>
         </p:spPr>

</xml_diff>